<commit_message>
Initial Feature Engineering file added.
</commit_message>
<xml_diff>
--- a/CSML1010_Group3_Project_Proposal.pptx
+++ b/CSML1010_Group3_Project_Proposal.pptx
@@ -7,11 +7,18 @@
   <p:sldIdLst>
     <p:sldId id="257" r:id="rId2"/>
     <p:sldId id="258" r:id="rId3"/>
-    <p:sldId id="259" r:id="rId4"/>
-    <p:sldId id="260" r:id="rId5"/>
-    <p:sldId id="263" r:id="rId6"/>
-    <p:sldId id="261" r:id="rId7"/>
+    <p:sldId id="260" r:id="rId4"/>
+    <p:sldId id="259" r:id="rId5"/>
+    <p:sldId id="271" r:id="rId6"/>
+    <p:sldId id="263" r:id="rId7"/>
     <p:sldId id="262" r:id="rId8"/>
+    <p:sldId id="268" r:id="rId9"/>
+    <p:sldId id="270" r:id="rId10"/>
+    <p:sldId id="264" r:id="rId11"/>
+    <p:sldId id="272" r:id="rId12"/>
+    <p:sldId id="265" r:id="rId13"/>
+    <p:sldId id="266" r:id="rId14"/>
+    <p:sldId id="267" r:id="rId15"/>
   </p:sldIdLst>
   <p:sldSz cx="12192000" cy="6858000"/>
   <p:notesSz cx="6858000" cy="9144000"/>
@@ -110,6 +117,11 @@
       </a:defRPr>
     </a:lvl9pPr>
   </p:defaultTextStyle>
+  <p:extLst>
+    <p:ext uri="{EFAFB233-063F-42B5-8137-9DF3F51BA10A}">
+      <p15:sldGuideLst xmlns:p15="http://schemas.microsoft.com/office/powerpoint/2012/main"/>
+    </p:ext>
+  </p:extLst>
 </p:presentation>
 </file>
 
@@ -262,7 +274,7 @@
           <a:p>
             <a:fld id="{41214EFD-F6C2-4FF2-A372-B412D13DB261}" type="datetimeFigureOut">
               <a:rPr lang="en-CA" smtClean="0"/>
-              <a:t>2020-03-29</a:t>
+              <a:t>2020-04-04</a:t>
             </a:fld>
             <a:endParaRPr lang="en-CA"/>
           </a:p>
@@ -462,7 +474,7 @@
           <a:p>
             <a:fld id="{41214EFD-F6C2-4FF2-A372-B412D13DB261}" type="datetimeFigureOut">
               <a:rPr lang="en-CA" smtClean="0"/>
-              <a:t>2020-03-29</a:t>
+              <a:t>2020-04-04</a:t>
             </a:fld>
             <a:endParaRPr lang="en-CA"/>
           </a:p>
@@ -672,7 +684,7 @@
           <a:p>
             <a:fld id="{41214EFD-F6C2-4FF2-A372-B412D13DB261}" type="datetimeFigureOut">
               <a:rPr lang="en-CA" smtClean="0"/>
-              <a:t>2020-03-29</a:t>
+              <a:t>2020-04-04</a:t>
             </a:fld>
             <a:endParaRPr lang="en-CA"/>
           </a:p>
@@ -872,7 +884,7 @@
           <a:p>
             <a:fld id="{41214EFD-F6C2-4FF2-A372-B412D13DB261}" type="datetimeFigureOut">
               <a:rPr lang="en-CA" smtClean="0"/>
-              <a:t>2020-03-29</a:t>
+              <a:t>2020-04-04</a:t>
             </a:fld>
             <a:endParaRPr lang="en-CA"/>
           </a:p>
@@ -1148,7 +1160,7 @@
           <a:p>
             <a:fld id="{41214EFD-F6C2-4FF2-A372-B412D13DB261}" type="datetimeFigureOut">
               <a:rPr lang="en-CA" smtClean="0"/>
-              <a:t>2020-03-29</a:t>
+              <a:t>2020-04-04</a:t>
             </a:fld>
             <a:endParaRPr lang="en-CA"/>
           </a:p>
@@ -1416,7 +1428,7 @@
           <a:p>
             <a:fld id="{41214EFD-F6C2-4FF2-A372-B412D13DB261}" type="datetimeFigureOut">
               <a:rPr lang="en-CA" smtClean="0"/>
-              <a:t>2020-03-29</a:t>
+              <a:t>2020-04-04</a:t>
             </a:fld>
             <a:endParaRPr lang="en-CA"/>
           </a:p>
@@ -1831,7 +1843,7 @@
           <a:p>
             <a:fld id="{41214EFD-F6C2-4FF2-A372-B412D13DB261}" type="datetimeFigureOut">
               <a:rPr lang="en-CA" smtClean="0"/>
-              <a:t>2020-03-29</a:t>
+              <a:t>2020-04-04</a:t>
             </a:fld>
             <a:endParaRPr lang="en-CA"/>
           </a:p>
@@ -1973,7 +1985,7 @@
           <a:p>
             <a:fld id="{41214EFD-F6C2-4FF2-A372-B412D13DB261}" type="datetimeFigureOut">
               <a:rPr lang="en-CA" smtClean="0"/>
-              <a:t>2020-03-29</a:t>
+              <a:t>2020-04-04</a:t>
             </a:fld>
             <a:endParaRPr lang="en-CA"/>
           </a:p>
@@ -2086,7 +2098,7 @@
           <a:p>
             <a:fld id="{41214EFD-F6C2-4FF2-A372-B412D13DB261}" type="datetimeFigureOut">
               <a:rPr lang="en-CA" smtClean="0"/>
-              <a:t>2020-03-29</a:t>
+              <a:t>2020-04-04</a:t>
             </a:fld>
             <a:endParaRPr lang="en-CA"/>
           </a:p>
@@ -2399,7 +2411,7 @@
           <a:p>
             <a:fld id="{41214EFD-F6C2-4FF2-A372-B412D13DB261}" type="datetimeFigureOut">
               <a:rPr lang="en-CA" smtClean="0"/>
-              <a:t>2020-03-29</a:t>
+              <a:t>2020-04-04</a:t>
             </a:fld>
             <a:endParaRPr lang="en-CA"/>
           </a:p>
@@ -2688,7 +2700,7 @@
           <a:p>
             <a:fld id="{41214EFD-F6C2-4FF2-A372-B412D13DB261}" type="datetimeFigureOut">
               <a:rPr lang="en-CA" smtClean="0"/>
-              <a:t>2020-03-29</a:t>
+              <a:t>2020-04-04</a:t>
             </a:fld>
             <a:endParaRPr lang="en-CA"/>
           </a:p>
@@ -2931,7 +2943,7 @@
           <a:p>
             <a:fld id="{41214EFD-F6C2-4FF2-A372-B412D13DB261}" type="datetimeFigureOut">
               <a:rPr lang="en-CA" smtClean="0"/>
-              <a:t>2020-03-29</a:t>
+              <a:t>2020-04-04</a:t>
             </a:fld>
             <a:endParaRPr lang="en-CA"/>
           </a:p>
@@ -3441,6 +3453,789 @@
 </p:sld>
 </file>
 
+<file path=ppt/slides/slide10.xml><?xml version="1.0" encoding="utf-8"?>
+<p:sld xmlns:a="http://schemas.openxmlformats.org/drawingml/2006/main" xmlns:r="http://schemas.openxmlformats.org/officeDocument/2006/relationships" xmlns:p="http://schemas.openxmlformats.org/presentationml/2006/main">
+  <p:cSld>
+    <p:spTree>
+      <p:nvGrpSpPr>
+        <p:cNvPr id="1" name=""/>
+        <p:cNvGrpSpPr/>
+        <p:nvPr/>
+      </p:nvGrpSpPr>
+      <p:grpSpPr>
+        <a:xfrm>
+          <a:off x="0" y="0"/>
+          <a:ext cx="0" cy="0"/>
+          <a:chOff x="0" y="0"/>
+          <a:chExt cx="0" cy="0"/>
+        </a:xfrm>
+      </p:grpSpPr>
+      <p:sp>
+        <p:nvSpPr>
+          <p:cNvPr id="2" name="Title 1">
+            <a:extLst>
+              <a:ext uri="{FF2B5EF4-FFF2-40B4-BE49-F238E27FC236}">
+                <a16:creationId xmlns:a16="http://schemas.microsoft.com/office/drawing/2014/main" id="{078EF1BB-AFD2-4159-A52A-3DC689ABE7D4}"/>
+              </a:ext>
+            </a:extLst>
+          </p:cNvPr>
+          <p:cNvSpPr>
+            <a:spLocks noGrp="1"/>
+          </p:cNvSpPr>
+          <p:nvPr>
+            <p:ph type="title"/>
+          </p:nvPr>
+        </p:nvSpPr>
+        <p:spPr/>
+        <p:txBody>
+          <a:bodyPr/>
+          <a:lstStyle/>
+          <a:p>
+            <a:r>
+              <a:rPr lang="en-US" dirty="0"/>
+              <a:t>Feature Engineering</a:t>
+            </a:r>
+            <a:endParaRPr lang="en-CA" dirty="0"/>
+          </a:p>
+        </p:txBody>
+      </p:sp>
+      <p:sp>
+        <p:nvSpPr>
+          <p:cNvPr id="3" name="Content Placeholder 2">
+            <a:extLst>
+              <a:ext uri="{FF2B5EF4-FFF2-40B4-BE49-F238E27FC236}">
+                <a16:creationId xmlns:a16="http://schemas.microsoft.com/office/drawing/2014/main" id="{BBF25745-2319-41A5-8F32-0F1397062099}"/>
+              </a:ext>
+            </a:extLst>
+          </p:cNvPr>
+          <p:cNvSpPr>
+            <a:spLocks noGrp="1"/>
+          </p:cNvSpPr>
+          <p:nvPr>
+            <p:ph sz="half" idx="1"/>
+          </p:nvPr>
+        </p:nvSpPr>
+        <p:spPr>
+          <a:xfrm>
+            <a:off x="838200" y="1825625"/>
+            <a:ext cx="3685674" cy="4351338"/>
+          </a:xfrm>
+        </p:spPr>
+        <p:txBody>
+          <a:bodyPr>
+            <a:normAutofit fontScale="85000" lnSpcReduction="20000"/>
+          </a:bodyPr>
+          <a:lstStyle/>
+          <a:p>
+            <a:r>
+              <a:rPr lang="en-US" sz="2400" dirty="0"/>
+              <a:t>Count Vectors:</a:t>
+            </a:r>
+          </a:p>
+          <a:p>
+            <a:pPr lvl="1"/>
+            <a:r>
+              <a:rPr lang="en-US" sz="2000" dirty="0"/>
+              <a:t>Bag-of-words</a:t>
+            </a:r>
+          </a:p>
+          <a:p>
+            <a:pPr lvl="1"/>
+            <a:r>
+              <a:rPr lang="en-US" sz="2000" dirty="0"/>
+              <a:t>Bag of n-grams</a:t>
+            </a:r>
+          </a:p>
+          <a:p>
+            <a:r>
+              <a:rPr lang="en-US" sz="2400" dirty="0"/>
+              <a:t>TF-IDF Vectors:</a:t>
+            </a:r>
+          </a:p>
+          <a:p>
+            <a:pPr lvl="1"/>
+            <a:r>
+              <a:rPr lang="en-US" sz="2000" dirty="0"/>
+              <a:t>Word level</a:t>
+            </a:r>
+          </a:p>
+          <a:p>
+            <a:pPr lvl="1"/>
+            <a:r>
+              <a:rPr lang="en-US" sz="2000" dirty="0"/>
+              <a:t>N-gram level</a:t>
+            </a:r>
+          </a:p>
+          <a:p>
+            <a:r>
+              <a:rPr lang="en-US" sz="2400" dirty="0"/>
+              <a:t>Word Embeddings:</a:t>
+            </a:r>
+          </a:p>
+          <a:p>
+            <a:pPr lvl="1"/>
+            <a:r>
+              <a:rPr lang="en-US" sz="2000" dirty="0"/>
+              <a:t>Word2vec</a:t>
+            </a:r>
+          </a:p>
+          <a:p>
+            <a:pPr lvl="1"/>
+            <a:r>
+              <a:rPr lang="en-US" sz="2000" dirty="0"/>
+              <a:t>Glove</a:t>
+            </a:r>
+          </a:p>
+          <a:p>
+            <a:r>
+              <a:rPr lang="en-US" sz="2400" dirty="0"/>
+              <a:t>NLP Based:</a:t>
+            </a:r>
+          </a:p>
+          <a:p>
+            <a:pPr lvl="1"/>
+            <a:r>
+              <a:rPr lang="en-US" sz="2000" dirty="0"/>
+              <a:t>Noun, Verb, Adjective, Adverb, Pronoun Counts</a:t>
+            </a:r>
+          </a:p>
+          <a:p>
+            <a:r>
+              <a:rPr lang="en-US" sz="2400" dirty="0"/>
+              <a:t>Language Models:</a:t>
+            </a:r>
+          </a:p>
+          <a:p>
+            <a:pPr lvl="1"/>
+            <a:r>
+              <a:rPr lang="en-US" sz="2000" dirty="0"/>
+              <a:t>BERT</a:t>
+            </a:r>
+          </a:p>
+          <a:p>
+            <a:pPr lvl="1"/>
+            <a:r>
+              <a:rPr lang="en-US" sz="2000" dirty="0"/>
+              <a:t>FLAIR</a:t>
+            </a:r>
+          </a:p>
+          <a:p>
+            <a:pPr lvl="1"/>
+            <a:endParaRPr lang="en-CA" dirty="0"/>
+          </a:p>
+        </p:txBody>
+      </p:sp>
+      <p:pic>
+        <p:nvPicPr>
+          <p:cNvPr id="5" name="Picture 4">
+            <a:extLst>
+              <a:ext uri="{FF2B5EF4-FFF2-40B4-BE49-F238E27FC236}">
+                <a16:creationId xmlns:a16="http://schemas.microsoft.com/office/drawing/2014/main" id="{C0ABCD7D-3D11-4397-9E1B-C7E9D26B7145}"/>
+              </a:ext>
+            </a:extLst>
+          </p:cNvPr>
+          <p:cNvPicPr>
+            <a:picLocks noChangeAspect="1"/>
+          </p:cNvPicPr>
+          <p:nvPr/>
+        </p:nvPicPr>
+        <p:blipFill>
+          <a:blip r:embed="rId2"/>
+          <a:stretch>
+            <a:fillRect/>
+          </a:stretch>
+        </p:blipFill>
+        <p:spPr>
+          <a:xfrm>
+            <a:off x="4762597" y="3429000"/>
+            <a:ext cx="2372056" cy="2810267"/>
+          </a:xfrm>
+          <a:prstGeom prst="rect">
+            <a:avLst/>
+          </a:prstGeom>
+          <a:ln>
+            <a:noFill/>
+          </a:ln>
+          <a:effectLst>
+            <a:outerShdw blurRad="292100" dist="139700" dir="2700000" algn="tl" rotWithShape="0">
+              <a:srgbClr val="333333">
+                <a:alpha val="65000"/>
+              </a:srgbClr>
+            </a:outerShdw>
+          </a:effectLst>
+        </p:spPr>
+      </p:pic>
+      <p:pic>
+        <p:nvPicPr>
+          <p:cNvPr id="10" name="Picture 9">
+            <a:extLst>
+              <a:ext uri="{FF2B5EF4-FFF2-40B4-BE49-F238E27FC236}">
+                <a16:creationId xmlns:a16="http://schemas.microsoft.com/office/drawing/2014/main" id="{CF9A8BC5-A6ED-48A3-807C-15279E19B14B}"/>
+              </a:ext>
+            </a:extLst>
+          </p:cNvPr>
+          <p:cNvPicPr>
+            <a:picLocks noChangeAspect="1"/>
+          </p:cNvPicPr>
+          <p:nvPr/>
+        </p:nvPicPr>
+        <p:blipFill>
+          <a:blip r:embed="rId3"/>
+          <a:stretch>
+            <a:fillRect/>
+          </a:stretch>
+        </p:blipFill>
+        <p:spPr>
+          <a:xfrm>
+            <a:off x="4762597" y="1690688"/>
+            <a:ext cx="5811061" cy="1457528"/>
+          </a:xfrm>
+          <a:prstGeom prst="rect">
+            <a:avLst/>
+          </a:prstGeom>
+        </p:spPr>
+      </p:pic>
+    </p:spTree>
+    <p:extLst>
+      <p:ext uri="{BB962C8B-B14F-4D97-AF65-F5344CB8AC3E}">
+        <p14:creationId xmlns:p14="http://schemas.microsoft.com/office/powerpoint/2010/main" val="1667447050"/>
+      </p:ext>
+    </p:extLst>
+  </p:cSld>
+  <p:clrMapOvr>
+    <a:masterClrMapping/>
+  </p:clrMapOvr>
+</p:sld>
+</file>
+
+<file path=ppt/slides/slide11.xml><?xml version="1.0" encoding="utf-8"?>
+<p:sld xmlns:a="http://schemas.openxmlformats.org/drawingml/2006/main" xmlns:r="http://schemas.openxmlformats.org/officeDocument/2006/relationships" xmlns:p="http://schemas.openxmlformats.org/presentationml/2006/main">
+  <p:cSld>
+    <p:spTree>
+      <p:nvGrpSpPr>
+        <p:cNvPr id="1" name=""/>
+        <p:cNvGrpSpPr/>
+        <p:nvPr/>
+      </p:nvGrpSpPr>
+      <p:grpSpPr>
+        <a:xfrm>
+          <a:off x="0" y="0"/>
+          <a:ext cx="0" cy="0"/>
+          <a:chOff x="0" y="0"/>
+          <a:chExt cx="0" cy="0"/>
+        </a:xfrm>
+      </p:grpSpPr>
+      <p:sp>
+        <p:nvSpPr>
+          <p:cNvPr id="2" name="Title 1">
+            <a:extLst>
+              <a:ext uri="{FF2B5EF4-FFF2-40B4-BE49-F238E27FC236}">
+                <a16:creationId xmlns:a16="http://schemas.microsoft.com/office/drawing/2014/main" id="{E91765FA-4B3C-4998-B1A5-ECCCDBFBEB55}"/>
+              </a:ext>
+            </a:extLst>
+          </p:cNvPr>
+          <p:cNvSpPr>
+            <a:spLocks noGrp="1"/>
+          </p:cNvSpPr>
+          <p:nvPr>
+            <p:ph type="title"/>
+          </p:nvPr>
+        </p:nvSpPr>
+        <p:spPr/>
+        <p:txBody>
+          <a:bodyPr/>
+          <a:lstStyle/>
+          <a:p>
+            <a:r>
+              <a:rPr lang="en-US" dirty="0"/>
+              <a:t>Feature Engineering</a:t>
+            </a:r>
+            <a:endParaRPr lang="en-CA" dirty="0"/>
+          </a:p>
+        </p:txBody>
+      </p:sp>
+      <p:pic>
+        <p:nvPicPr>
+          <p:cNvPr id="5" name="Picture 4">
+            <a:extLst>
+              <a:ext uri="{FF2B5EF4-FFF2-40B4-BE49-F238E27FC236}">
+                <a16:creationId xmlns:a16="http://schemas.microsoft.com/office/drawing/2014/main" id="{AE2E5006-E716-4E69-9AF2-91452EF4364F}"/>
+              </a:ext>
+            </a:extLst>
+          </p:cNvPr>
+          <p:cNvPicPr>
+            <a:picLocks noChangeAspect="1"/>
+          </p:cNvPicPr>
+          <p:nvPr/>
+        </p:nvPicPr>
+        <p:blipFill>
+          <a:blip r:embed="rId2"/>
+          <a:stretch>
+            <a:fillRect/>
+          </a:stretch>
+        </p:blipFill>
+        <p:spPr>
+          <a:xfrm>
+            <a:off x="181251" y="1952484"/>
+            <a:ext cx="11731485" cy="3693714"/>
+          </a:xfrm>
+          <a:prstGeom prst="rect">
+            <a:avLst/>
+          </a:prstGeom>
+        </p:spPr>
+      </p:pic>
+    </p:spTree>
+    <p:extLst>
+      <p:ext uri="{BB962C8B-B14F-4D97-AF65-F5344CB8AC3E}">
+        <p14:creationId xmlns:p14="http://schemas.microsoft.com/office/powerpoint/2010/main" val="2111751455"/>
+      </p:ext>
+    </p:extLst>
+  </p:cSld>
+  <p:clrMapOvr>
+    <a:masterClrMapping/>
+  </p:clrMapOvr>
+</p:sld>
+</file>
+
+<file path=ppt/slides/slide12.xml><?xml version="1.0" encoding="utf-8"?>
+<p:sld xmlns:a="http://schemas.openxmlformats.org/drawingml/2006/main" xmlns:r="http://schemas.openxmlformats.org/officeDocument/2006/relationships" xmlns:p="http://schemas.openxmlformats.org/presentationml/2006/main">
+  <p:cSld>
+    <p:spTree>
+      <p:nvGrpSpPr>
+        <p:cNvPr id="1" name=""/>
+        <p:cNvGrpSpPr/>
+        <p:nvPr/>
+      </p:nvGrpSpPr>
+      <p:grpSpPr>
+        <a:xfrm>
+          <a:off x="0" y="0"/>
+          <a:ext cx="0" cy="0"/>
+          <a:chOff x="0" y="0"/>
+          <a:chExt cx="0" cy="0"/>
+        </a:xfrm>
+      </p:grpSpPr>
+      <p:sp>
+        <p:nvSpPr>
+          <p:cNvPr id="2" name="Title 1">
+            <a:extLst>
+              <a:ext uri="{FF2B5EF4-FFF2-40B4-BE49-F238E27FC236}">
+                <a16:creationId xmlns:a16="http://schemas.microsoft.com/office/drawing/2014/main" id="{870FBE34-B0C7-4B7F-BB4F-816CB426133A}"/>
+              </a:ext>
+            </a:extLst>
+          </p:cNvPr>
+          <p:cNvSpPr>
+            <a:spLocks noGrp="1"/>
+          </p:cNvSpPr>
+          <p:nvPr>
+            <p:ph type="title"/>
+          </p:nvPr>
+        </p:nvSpPr>
+        <p:spPr/>
+        <p:txBody>
+          <a:bodyPr/>
+          <a:lstStyle/>
+          <a:p>
+            <a:r>
+              <a:rPr lang="en-US" dirty="0"/>
+              <a:t>Feature Scaling &amp; Selection</a:t>
+            </a:r>
+            <a:endParaRPr lang="en-CA" dirty="0"/>
+          </a:p>
+        </p:txBody>
+      </p:sp>
+      <p:sp>
+        <p:nvSpPr>
+          <p:cNvPr id="3" name="Content Placeholder 2">
+            <a:extLst>
+              <a:ext uri="{FF2B5EF4-FFF2-40B4-BE49-F238E27FC236}">
+                <a16:creationId xmlns:a16="http://schemas.microsoft.com/office/drawing/2014/main" id="{28DD9FCC-BF60-4E8B-BBF9-F489B8ED8CC6}"/>
+              </a:ext>
+            </a:extLst>
+          </p:cNvPr>
+          <p:cNvSpPr>
+            <a:spLocks noGrp="1"/>
+          </p:cNvSpPr>
+          <p:nvPr>
+            <p:ph sz="half" idx="1"/>
+          </p:nvPr>
+        </p:nvSpPr>
+        <p:spPr/>
+        <p:txBody>
+          <a:bodyPr/>
+          <a:lstStyle/>
+          <a:p>
+            <a:r>
+              <a:rPr lang="en-US" dirty="0"/>
+              <a:t>Feature selection will be based on benchmarking of features using a reference model</a:t>
+            </a:r>
+          </a:p>
+          <a:p>
+            <a:r>
+              <a:rPr lang="en-US" dirty="0"/>
+              <a:t>Feature Importance Analysis</a:t>
+            </a:r>
+          </a:p>
+          <a:p>
+            <a:r>
+              <a:rPr lang="en-US" dirty="0"/>
+              <a:t>PCA </a:t>
+            </a:r>
+          </a:p>
+          <a:p>
+            <a:pPr lvl="1"/>
+            <a:endParaRPr lang="en-CA" dirty="0"/>
+          </a:p>
+        </p:txBody>
+      </p:sp>
+    </p:spTree>
+    <p:extLst>
+      <p:ext uri="{BB962C8B-B14F-4D97-AF65-F5344CB8AC3E}">
+        <p14:creationId xmlns:p14="http://schemas.microsoft.com/office/powerpoint/2010/main" val="4185075957"/>
+      </p:ext>
+    </p:extLst>
+  </p:cSld>
+  <p:clrMapOvr>
+    <a:masterClrMapping/>
+  </p:clrMapOvr>
+</p:sld>
+</file>
+
+<file path=ppt/slides/slide13.xml><?xml version="1.0" encoding="utf-8"?>
+<p:sld xmlns:a="http://schemas.openxmlformats.org/drawingml/2006/main" xmlns:r="http://schemas.openxmlformats.org/officeDocument/2006/relationships" xmlns:p="http://schemas.openxmlformats.org/presentationml/2006/main">
+  <p:cSld>
+    <p:spTree>
+      <p:nvGrpSpPr>
+        <p:cNvPr id="1" name=""/>
+        <p:cNvGrpSpPr/>
+        <p:nvPr/>
+      </p:nvGrpSpPr>
+      <p:grpSpPr>
+        <a:xfrm>
+          <a:off x="0" y="0"/>
+          <a:ext cx="0" cy="0"/>
+          <a:chOff x="0" y="0"/>
+          <a:chExt cx="0" cy="0"/>
+        </a:xfrm>
+      </p:grpSpPr>
+      <p:sp>
+        <p:nvSpPr>
+          <p:cNvPr id="2" name="Title 1">
+            <a:extLst>
+              <a:ext uri="{FF2B5EF4-FFF2-40B4-BE49-F238E27FC236}">
+                <a16:creationId xmlns:a16="http://schemas.microsoft.com/office/drawing/2014/main" id="{36E293E0-B124-40F8-B65E-0F7E184B2806}"/>
+              </a:ext>
+            </a:extLst>
+          </p:cNvPr>
+          <p:cNvSpPr>
+            <a:spLocks noGrp="1"/>
+          </p:cNvSpPr>
+          <p:nvPr>
+            <p:ph type="title"/>
+          </p:nvPr>
+        </p:nvSpPr>
+        <p:spPr/>
+        <p:txBody>
+          <a:bodyPr/>
+          <a:lstStyle/>
+          <a:p>
+            <a:r>
+              <a:rPr lang="en-US" dirty="0"/>
+              <a:t>Modeling </a:t>
+            </a:r>
+            <a:endParaRPr lang="en-CA" b="1" dirty="0"/>
+          </a:p>
+        </p:txBody>
+      </p:sp>
+      <p:sp>
+        <p:nvSpPr>
+          <p:cNvPr id="3" name="Content Placeholder 2">
+            <a:extLst>
+              <a:ext uri="{FF2B5EF4-FFF2-40B4-BE49-F238E27FC236}">
+                <a16:creationId xmlns:a16="http://schemas.microsoft.com/office/drawing/2014/main" id="{8DC56CB5-6CC6-4054-8942-810A4157C785}"/>
+              </a:ext>
+            </a:extLst>
+          </p:cNvPr>
+          <p:cNvSpPr>
+            <a:spLocks noGrp="1"/>
+          </p:cNvSpPr>
+          <p:nvPr>
+            <p:ph sz="half" idx="1"/>
+          </p:nvPr>
+        </p:nvSpPr>
+        <p:spPr/>
+        <p:txBody>
+          <a:bodyPr/>
+          <a:lstStyle/>
+          <a:p>
+            <a:pPr marL="0" indent="0">
+              <a:buNone/>
+            </a:pPr>
+            <a:r>
+              <a:rPr lang="en-US" dirty="0"/>
+              <a:t>Splitting the Dataset</a:t>
+            </a:r>
+          </a:p>
+          <a:p>
+            <a:r>
+              <a:rPr lang="en-US" dirty="0"/>
+              <a:t>For Modeling we will split the dataset into train and test sets. The models will be built with the train set and evaluation with the test set.</a:t>
+            </a:r>
+          </a:p>
+          <a:p>
+            <a:endParaRPr lang="en-US" dirty="0"/>
+          </a:p>
+        </p:txBody>
+      </p:sp>
+      <p:sp>
+        <p:nvSpPr>
+          <p:cNvPr id="5" name="Content Placeholder 4">
+            <a:extLst>
+              <a:ext uri="{FF2B5EF4-FFF2-40B4-BE49-F238E27FC236}">
+                <a16:creationId xmlns:a16="http://schemas.microsoft.com/office/drawing/2014/main" id="{EBDA7A7E-E5A7-4A47-9F5E-13EFA8C9BC05}"/>
+              </a:ext>
+            </a:extLst>
+          </p:cNvPr>
+          <p:cNvSpPr>
+            <a:spLocks noGrp="1"/>
+          </p:cNvSpPr>
+          <p:nvPr>
+            <p:ph sz="half" idx="2"/>
+          </p:nvPr>
+        </p:nvSpPr>
+        <p:spPr/>
+        <p:txBody>
+          <a:bodyPr/>
+          <a:lstStyle/>
+          <a:p>
+            <a:pPr marL="0" indent="0">
+              <a:buNone/>
+            </a:pPr>
+            <a:r>
+              <a:rPr lang="en-US" dirty="0"/>
+              <a:t>Algorithms</a:t>
+            </a:r>
+          </a:p>
+          <a:p>
+            <a:r>
+              <a:rPr lang="en-US" dirty="0"/>
+              <a:t>Naive Bayes (multinomial):</a:t>
+            </a:r>
+          </a:p>
+          <a:p>
+            <a:r>
+              <a:rPr lang="en-US" dirty="0"/>
+              <a:t>Logistic regression.</a:t>
+            </a:r>
+          </a:p>
+          <a:p>
+            <a:r>
+              <a:rPr lang="en-US" dirty="0"/>
+              <a:t>Support vector machine.</a:t>
+            </a:r>
+          </a:p>
+          <a:p>
+            <a:r>
+              <a:rPr lang="en-US" dirty="0"/>
+              <a:t>Decision tree (random forest).</a:t>
+            </a:r>
+          </a:p>
+          <a:p>
+            <a:r>
+              <a:rPr lang="en-US" dirty="0"/>
+              <a:t>Ensemble: Bagging, Boosting</a:t>
+            </a:r>
+          </a:p>
+          <a:p>
+            <a:endParaRPr lang="en-CA" dirty="0"/>
+          </a:p>
+        </p:txBody>
+      </p:sp>
+    </p:spTree>
+    <p:extLst>
+      <p:ext uri="{BB962C8B-B14F-4D97-AF65-F5344CB8AC3E}">
+        <p14:creationId xmlns:p14="http://schemas.microsoft.com/office/powerpoint/2010/main" val="1439624405"/>
+      </p:ext>
+    </p:extLst>
+  </p:cSld>
+  <p:clrMapOvr>
+    <a:masterClrMapping/>
+  </p:clrMapOvr>
+</p:sld>
+</file>
+
+<file path=ppt/slides/slide14.xml><?xml version="1.0" encoding="utf-8"?>
+<p:sld xmlns:a="http://schemas.openxmlformats.org/drawingml/2006/main" xmlns:r="http://schemas.openxmlformats.org/officeDocument/2006/relationships" xmlns:p="http://schemas.openxmlformats.org/presentationml/2006/main">
+  <p:cSld>
+    <p:spTree>
+      <p:nvGrpSpPr>
+        <p:cNvPr id="1" name=""/>
+        <p:cNvGrpSpPr/>
+        <p:nvPr/>
+      </p:nvGrpSpPr>
+      <p:grpSpPr>
+        <a:xfrm>
+          <a:off x="0" y="0"/>
+          <a:ext cx="0" cy="0"/>
+          <a:chOff x="0" y="0"/>
+          <a:chExt cx="0" cy="0"/>
+        </a:xfrm>
+      </p:grpSpPr>
+      <p:sp>
+        <p:nvSpPr>
+          <p:cNvPr id="2" name="Title 1">
+            <a:extLst>
+              <a:ext uri="{FF2B5EF4-FFF2-40B4-BE49-F238E27FC236}">
+                <a16:creationId xmlns:a16="http://schemas.microsoft.com/office/drawing/2014/main" id="{B53DA40B-5FFC-47EC-9B0E-7D4F582DBD8D}"/>
+              </a:ext>
+            </a:extLst>
+          </p:cNvPr>
+          <p:cNvSpPr>
+            <a:spLocks noGrp="1"/>
+          </p:cNvSpPr>
+          <p:nvPr>
+            <p:ph type="title"/>
+          </p:nvPr>
+        </p:nvSpPr>
+        <p:spPr/>
+        <p:txBody>
+          <a:bodyPr/>
+          <a:lstStyle/>
+          <a:p>
+            <a:r>
+              <a:rPr lang="en-US" dirty="0"/>
+              <a:t>Model Evaluation, Tuning and Selection</a:t>
+            </a:r>
+            <a:endParaRPr lang="en-CA" b="1" dirty="0"/>
+          </a:p>
+        </p:txBody>
+      </p:sp>
+      <p:sp>
+        <p:nvSpPr>
+          <p:cNvPr id="3" name="Content Placeholder 2">
+            <a:extLst>
+              <a:ext uri="{FF2B5EF4-FFF2-40B4-BE49-F238E27FC236}">
+                <a16:creationId xmlns:a16="http://schemas.microsoft.com/office/drawing/2014/main" id="{C64C974E-EEA6-4324-A5BC-A5804310E23C}"/>
+              </a:ext>
+            </a:extLst>
+          </p:cNvPr>
+          <p:cNvSpPr>
+            <a:spLocks noGrp="1"/>
+          </p:cNvSpPr>
+          <p:nvPr>
+            <p:ph sz="half" idx="1"/>
+          </p:nvPr>
+        </p:nvSpPr>
+        <p:spPr/>
+        <p:txBody>
+          <a:bodyPr>
+            <a:normAutofit lnSpcReduction="10000"/>
+          </a:bodyPr>
+          <a:lstStyle/>
+          <a:p>
+            <a:r>
+              <a:rPr lang="en-CA" dirty="0"/>
+              <a:t>Confusion Matrix</a:t>
+            </a:r>
+          </a:p>
+          <a:p>
+            <a:r>
+              <a:rPr lang="en-CA" dirty="0"/>
+              <a:t>Metrics: </a:t>
+            </a:r>
+          </a:p>
+          <a:p>
+            <a:pPr lvl="1"/>
+            <a:r>
+              <a:rPr lang="en-CA" dirty="0"/>
+              <a:t>Accuracy</a:t>
+            </a:r>
+          </a:p>
+          <a:p>
+            <a:pPr lvl="1"/>
+            <a:r>
+              <a:rPr lang="en-CA" dirty="0"/>
+              <a:t>Precision</a:t>
+            </a:r>
+          </a:p>
+          <a:p>
+            <a:pPr lvl="1"/>
+            <a:r>
+              <a:rPr lang="en-CA" dirty="0"/>
+              <a:t>Recall</a:t>
+            </a:r>
+          </a:p>
+          <a:p>
+            <a:pPr lvl="1"/>
+            <a:r>
+              <a:rPr lang="en-CA" dirty="0"/>
+              <a:t>F1 Score</a:t>
+            </a:r>
+          </a:p>
+          <a:p>
+            <a:pPr marL="0" indent="0">
+              <a:buNone/>
+            </a:pPr>
+            <a:r>
+              <a:rPr lang="en-CA" dirty="0"/>
+              <a:t>Relying on the F1 Score rather than accuracy</a:t>
+            </a:r>
+          </a:p>
+          <a:p>
+            <a:r>
+              <a:rPr lang="en-CA" dirty="0"/>
+              <a:t>ROC</a:t>
+            </a:r>
+          </a:p>
+          <a:p>
+            <a:r>
+              <a:rPr lang="en-CA" dirty="0"/>
+              <a:t>Area under ROC</a:t>
+            </a:r>
+          </a:p>
+        </p:txBody>
+      </p:sp>
+      <p:sp>
+        <p:nvSpPr>
+          <p:cNvPr id="5" name="Content Placeholder 4">
+            <a:extLst>
+              <a:ext uri="{FF2B5EF4-FFF2-40B4-BE49-F238E27FC236}">
+                <a16:creationId xmlns:a16="http://schemas.microsoft.com/office/drawing/2014/main" id="{5F4A4D91-3806-42AE-A554-9846A27209E6}"/>
+              </a:ext>
+            </a:extLst>
+          </p:cNvPr>
+          <p:cNvSpPr>
+            <a:spLocks noGrp="1"/>
+          </p:cNvSpPr>
+          <p:nvPr>
+            <p:ph sz="half" idx="2"/>
+          </p:nvPr>
+        </p:nvSpPr>
+        <p:spPr/>
+        <p:txBody>
+          <a:bodyPr/>
+          <a:lstStyle/>
+          <a:p>
+            <a:r>
+              <a:rPr lang="en-US" dirty="0"/>
+              <a:t>Model Selection will be based on benchmarking of models based on the metrics identified during Model Evaluation (see items on the left)</a:t>
+            </a:r>
+            <a:endParaRPr lang="en-CA" dirty="0"/>
+          </a:p>
+        </p:txBody>
+      </p:sp>
+    </p:spTree>
+    <p:extLst>
+      <p:ext uri="{BB962C8B-B14F-4D97-AF65-F5344CB8AC3E}">
+        <p14:creationId xmlns:p14="http://schemas.microsoft.com/office/powerpoint/2010/main" val="666191102"/>
+      </p:ext>
+    </p:extLst>
+  </p:cSld>
+  <p:clrMapOvr>
+    <a:masterClrMapping/>
+  </p:clrMapOvr>
+</p:sld>
+</file>
+
 <file path=ppt/slides/slide2.xml><?xml version="1.0" encoding="utf-8"?>
 <p:sld xmlns:a="http://schemas.openxmlformats.org/drawingml/2006/main" xmlns:r="http://schemas.openxmlformats.org/officeDocument/2006/relationships" xmlns:p="http://schemas.openxmlformats.org/presentationml/2006/main">
   <p:cSld>
@@ -3505,14 +4300,10 @@
         </p:nvSpPr>
         <p:spPr/>
         <p:txBody>
-          <a:bodyPr/>
-          <a:lstStyle/>
-          <a:p>
-            <a:r>
-              <a:rPr lang="en-US" dirty="0"/>
-              <a:t>NLP Multi-Class Topic Classification Problem</a:t>
-            </a:r>
-          </a:p>
+          <a:bodyPr>
+            <a:normAutofit lnSpcReduction="10000"/>
+          </a:bodyPr>
+          <a:lstStyle/>
           <a:p>
             <a:r>
               <a:rPr lang="en-US" dirty="0"/>
@@ -3522,6 +4313,12 @@
           <a:p>
             <a:r>
               <a:rPr lang="en-US" dirty="0"/>
+              <a:t>NLP Multi-Label Text Classification Problem</a:t>
+            </a:r>
+          </a:p>
+          <a:p>
+            <a:r>
+              <a:rPr lang="en-US" dirty="0"/>
               <a:t>Data Preparation</a:t>
             </a:r>
           </a:p>
@@ -3536,7 +4333,30 @@
               <a:rPr lang="en-US" dirty="0"/>
               <a:t>Exploratory Data Analysis</a:t>
             </a:r>
-            <a:endParaRPr lang="en-CA" dirty="0"/>
+          </a:p>
+          <a:p>
+            <a:r>
+              <a:rPr lang="en-US" dirty="0"/>
+              <a:t>Feature Extraction &amp; Engineering</a:t>
+            </a:r>
+          </a:p>
+          <a:p>
+            <a:r>
+              <a:rPr lang="en-US" dirty="0"/>
+              <a:t>Feature Scaling &amp; Selection</a:t>
+            </a:r>
+          </a:p>
+          <a:p>
+            <a:r>
+              <a:rPr lang="en-US" dirty="0"/>
+              <a:t>Modeling </a:t>
+            </a:r>
+          </a:p>
+          <a:p>
+            <a:r>
+              <a:rPr lang="en-US" dirty="0"/>
+              <a:t>Model Evaluation &amp; Tuning</a:t>
+            </a:r>
           </a:p>
         </p:txBody>
       </p:sp>
@@ -3588,154 +4408,6 @@
         </p:nvSpPr>
         <p:spPr/>
         <p:txBody>
-          <a:bodyPr/>
-          <a:lstStyle/>
-          <a:p>
-            <a:r>
-              <a:rPr lang="en-US" dirty="0"/>
-              <a:t>NLP Multi-Class Topic Classification Problem</a:t>
-            </a:r>
-          </a:p>
-        </p:txBody>
-      </p:sp>
-      <p:sp>
-        <p:nvSpPr>
-          <p:cNvPr id="5" name="Content Placeholder 4">
-            <a:extLst>
-              <a:ext uri="{FF2B5EF4-FFF2-40B4-BE49-F238E27FC236}">
-                <a16:creationId xmlns:a16="http://schemas.microsoft.com/office/drawing/2014/main" id="{CCEDE552-9463-4CD8-8C88-2214A514F6F2}"/>
-              </a:ext>
-            </a:extLst>
-          </p:cNvPr>
-          <p:cNvSpPr>
-            <a:spLocks noGrp="1"/>
-          </p:cNvSpPr>
-          <p:nvPr>
-            <p:ph sz="half" idx="1"/>
-          </p:nvPr>
-        </p:nvSpPr>
-        <p:spPr/>
-        <p:txBody>
-          <a:bodyPr/>
-          <a:lstStyle/>
-          <a:p>
-            <a:r>
-              <a:rPr lang="en-US" dirty="0"/>
-              <a:t>The problem we will examine is a supervised text classification problem</a:t>
-            </a:r>
-          </a:p>
-          <a:p>
-            <a:r>
-              <a:rPr lang="en-US" dirty="0"/>
-              <a:t>The goal is to identify the machine learning method that best identifies the category for which the dialog conversation belongs</a:t>
-            </a:r>
-          </a:p>
-          <a:p>
-            <a:r>
-              <a:rPr lang="en-US" dirty="0"/>
-              <a:t>This is a multi-class topic classification problem</a:t>
-            </a:r>
-            <a:endParaRPr lang="en-CA" dirty="0"/>
-          </a:p>
-        </p:txBody>
-      </p:sp>
-      <p:pic>
-        <p:nvPicPr>
-          <p:cNvPr id="7" name="Picture 2" descr="Machine generated alternative text:&#10;Review on CRISP-DM &#10;Dat asets &#10;Data &#10;Processing &amp; &#10;Wrmgling &#10;Data Retrieval &#10;Feature &#10;Extraction &amp; &#10;Erg ineering &#10;Feature &#10;Scaling &amp; &#10;Selection &#10;MEhire &#10;Lerning &#10;Al ithm &#10;Modeling &#10;Mi lestone2 &#10;Mmitoring &#10;Tming &#10;Proposal &#10;Mi lestonel &#10;Data fteparation &#10;Re-iterate till satisfactory model perfomunce &#10;Final Presentation ">
-            <a:extLst>
-              <a:ext uri="{FF2B5EF4-FFF2-40B4-BE49-F238E27FC236}">
-                <a16:creationId xmlns:a16="http://schemas.microsoft.com/office/drawing/2014/main" id="{225D0DF2-46BF-4216-8267-F9F5C7B2358D}"/>
-              </a:ext>
-            </a:extLst>
-          </p:cNvPr>
-          <p:cNvPicPr>
-            <a:picLocks noGrp="1" noChangeAspect="1" noChangeArrowheads="1"/>
-          </p:cNvPicPr>
-          <p:nvPr>
-            <p:ph sz="half" idx="2"/>
-          </p:nvPr>
-        </p:nvPicPr>
-        <p:blipFill>
-          <a:blip r:embed="rId2">
-            <a:extLst>
-              <a:ext uri="{28A0092B-C50C-407E-A947-70E740481C1C}">
-                <a14:useLocalDpi xmlns:a14="http://schemas.microsoft.com/office/drawing/2010/main" val="0"/>
-              </a:ext>
-            </a:extLst>
-          </a:blip>
-          <a:srcRect/>
-          <a:stretch>
-            <a:fillRect/>
-          </a:stretch>
-        </p:blipFill>
-        <p:spPr bwMode="auto">
-          <a:xfrm>
-            <a:off x="6172200" y="2663957"/>
-            <a:ext cx="5181600" cy="2674674"/>
-          </a:xfrm>
-          <a:prstGeom prst="rect">
-            <a:avLst/>
-          </a:prstGeom>
-          <a:noFill/>
-          <a:extLst>
-            <a:ext uri="{909E8E84-426E-40DD-AFC4-6F175D3DCCD1}">
-              <a14:hiddenFill xmlns:a14="http://schemas.microsoft.com/office/drawing/2010/main">
-                <a:solidFill>
-                  <a:srgbClr val="FFFFFF"/>
-                </a:solidFill>
-              </a14:hiddenFill>
-            </a:ext>
-          </a:extLst>
-        </p:spPr>
-      </p:pic>
-    </p:spTree>
-    <p:extLst>
-      <p:ext uri="{BB962C8B-B14F-4D97-AF65-F5344CB8AC3E}">
-        <p14:creationId xmlns:p14="http://schemas.microsoft.com/office/powerpoint/2010/main" val="3037118411"/>
-      </p:ext>
-    </p:extLst>
-  </p:cSld>
-  <p:clrMapOvr>
-    <a:masterClrMapping/>
-  </p:clrMapOvr>
-</p:sld>
-</file>
-
-<file path=ppt/slides/slide4.xml><?xml version="1.0" encoding="utf-8"?>
-<p:sld xmlns:a="http://schemas.openxmlformats.org/drawingml/2006/main" xmlns:r="http://schemas.openxmlformats.org/officeDocument/2006/relationships" xmlns:p="http://schemas.openxmlformats.org/presentationml/2006/main">
-  <p:cSld>
-    <p:spTree>
-      <p:nvGrpSpPr>
-        <p:cNvPr id="1" name=""/>
-        <p:cNvGrpSpPr/>
-        <p:nvPr/>
-      </p:nvGrpSpPr>
-      <p:grpSpPr>
-        <a:xfrm>
-          <a:off x="0" y="0"/>
-          <a:ext cx="0" cy="0"/>
-          <a:chOff x="0" y="0"/>
-          <a:chExt cx="0" cy="0"/>
-        </a:xfrm>
-      </p:grpSpPr>
-      <p:sp>
-        <p:nvSpPr>
-          <p:cNvPr id="4" name="Title 3">
-            <a:extLst>
-              <a:ext uri="{FF2B5EF4-FFF2-40B4-BE49-F238E27FC236}">
-                <a16:creationId xmlns:a16="http://schemas.microsoft.com/office/drawing/2014/main" id="{311E55CB-BA9F-49CC-844D-A22FA095A609}"/>
-              </a:ext>
-            </a:extLst>
-          </p:cNvPr>
-          <p:cNvSpPr>
-            <a:spLocks noGrp="1"/>
-          </p:cNvSpPr>
-          <p:nvPr>
-            <p:ph type="title"/>
-          </p:nvPr>
-        </p:nvSpPr>
-        <p:spPr/>
-        <p:txBody>
           <a:bodyPr>
             <a:normAutofit/>
           </a:bodyPr>
@@ -3813,15 +4485,23 @@
             </a:pPr>
             <a:r>
               <a:rPr lang="en-CA" dirty="0"/>
-              <a:t>For our project, the ‘self-</a:t>
-            </a:r>
-            <a:r>
-              <a:rPr lang="en-CA" dirty="0" err="1"/>
+              <a:t>For our project, the </a:t>
+            </a:r>
+            <a:r>
+              <a:rPr lang="en-CA" b="1" dirty="0"/>
+              <a:t>‘self-</a:t>
+            </a:r>
+            <a:r>
+              <a:rPr lang="en-CA" b="1" dirty="0" err="1"/>
               <a:t>dialogs.json</a:t>
             </a:r>
             <a:r>
+              <a:rPr lang="en-CA" b="1" dirty="0"/>
+              <a:t>’ </a:t>
+            </a:r>
+            <a:r>
               <a:rPr lang="en-CA" dirty="0"/>
-              <a:t>’ will be used</a:t>
+              <a:t>will be used</a:t>
             </a:r>
           </a:p>
         </p:txBody>
@@ -3965,6 +4645,169 @@
 </p:sld>
 </file>
 
+<file path=ppt/slides/slide4.xml><?xml version="1.0" encoding="utf-8"?>
+<p:sld xmlns:a="http://schemas.openxmlformats.org/drawingml/2006/main" xmlns:r="http://schemas.openxmlformats.org/officeDocument/2006/relationships" xmlns:p="http://schemas.openxmlformats.org/presentationml/2006/main">
+  <p:cSld>
+    <p:spTree>
+      <p:nvGrpSpPr>
+        <p:cNvPr id="1" name=""/>
+        <p:cNvGrpSpPr/>
+        <p:nvPr/>
+      </p:nvGrpSpPr>
+      <p:grpSpPr>
+        <a:xfrm>
+          <a:off x="0" y="0"/>
+          <a:ext cx="0" cy="0"/>
+          <a:chOff x="0" y="0"/>
+          <a:chExt cx="0" cy="0"/>
+        </a:xfrm>
+      </p:grpSpPr>
+      <p:sp>
+        <p:nvSpPr>
+          <p:cNvPr id="4" name="Title 3">
+            <a:extLst>
+              <a:ext uri="{FF2B5EF4-FFF2-40B4-BE49-F238E27FC236}">
+                <a16:creationId xmlns:a16="http://schemas.microsoft.com/office/drawing/2014/main" id="{311E55CB-BA9F-49CC-844D-A22FA095A609}"/>
+              </a:ext>
+            </a:extLst>
+          </p:cNvPr>
+          <p:cNvSpPr>
+            <a:spLocks noGrp="1"/>
+          </p:cNvSpPr>
+          <p:nvPr>
+            <p:ph type="title"/>
+          </p:nvPr>
+        </p:nvSpPr>
+        <p:spPr/>
+        <p:txBody>
+          <a:bodyPr/>
+          <a:lstStyle/>
+          <a:p>
+            <a:r>
+              <a:rPr lang="en-US" dirty="0"/>
+              <a:t>NLP Multi-Label Text Classification Problem</a:t>
+            </a:r>
+          </a:p>
+        </p:txBody>
+      </p:sp>
+      <p:sp>
+        <p:nvSpPr>
+          <p:cNvPr id="5" name="Content Placeholder 4">
+            <a:extLst>
+              <a:ext uri="{FF2B5EF4-FFF2-40B4-BE49-F238E27FC236}">
+                <a16:creationId xmlns:a16="http://schemas.microsoft.com/office/drawing/2014/main" id="{CCEDE552-9463-4CD8-8C88-2214A514F6F2}"/>
+              </a:ext>
+            </a:extLst>
+          </p:cNvPr>
+          <p:cNvSpPr>
+            <a:spLocks noGrp="1"/>
+          </p:cNvSpPr>
+          <p:nvPr>
+            <p:ph sz="half" idx="1"/>
+          </p:nvPr>
+        </p:nvSpPr>
+        <p:spPr/>
+        <p:txBody>
+          <a:bodyPr>
+            <a:normAutofit fontScale="92500" lnSpcReduction="20000"/>
+          </a:bodyPr>
+          <a:lstStyle/>
+          <a:p>
+            <a:r>
+              <a:rPr lang="en-US" dirty="0"/>
+              <a:t>The problem we will examine is a supervised multi-label text classification problem.  </a:t>
+            </a:r>
+          </a:p>
+          <a:p>
+            <a:r>
+              <a:rPr lang="en-US" dirty="0"/>
+              <a:t>The goal is to identify the machine learning method that best identifies the category for which the dialog conversation belongs</a:t>
+            </a:r>
+          </a:p>
+          <a:p>
+            <a:r>
+              <a:rPr lang="en-US" b="1" dirty="0"/>
+              <a:t>The input:</a:t>
+            </a:r>
+            <a:r>
+              <a:rPr lang="en-US" dirty="0"/>
+              <a:t> will be the text elements of each conversation concatenated together</a:t>
+            </a:r>
+          </a:p>
+          <a:p>
+            <a:r>
+              <a:rPr lang="en-US" b="1" dirty="0"/>
+              <a:t>The output:</a:t>
+            </a:r>
+            <a:r>
+              <a:rPr lang="en-US" dirty="0"/>
+              <a:t> will be the “instruction_id”, which is the type of conversation</a:t>
+            </a:r>
+          </a:p>
+        </p:txBody>
+      </p:sp>
+      <p:pic>
+        <p:nvPicPr>
+          <p:cNvPr id="7" name="Picture 2" descr="Machine generated alternative text:&#10;Review on CRISP-DM &#10;Dat asets &#10;Data &#10;Processing &amp; &#10;Wrmgling &#10;Data Retrieval &#10;Feature &#10;Extraction &amp; &#10;Erg ineering &#10;Feature &#10;Scaling &amp; &#10;Selection &#10;MEhire &#10;Lerning &#10;Al ithm &#10;Modeling &#10;Mi lestone2 &#10;Mmitoring &#10;Tming &#10;Proposal &#10;Mi lestonel &#10;Data fteparation &#10;Re-iterate till satisfactory model perfomunce &#10;Final Presentation ">
+            <a:extLst>
+              <a:ext uri="{FF2B5EF4-FFF2-40B4-BE49-F238E27FC236}">
+                <a16:creationId xmlns:a16="http://schemas.microsoft.com/office/drawing/2014/main" id="{225D0DF2-46BF-4216-8267-F9F5C7B2358D}"/>
+              </a:ext>
+            </a:extLst>
+          </p:cNvPr>
+          <p:cNvPicPr>
+            <a:picLocks noGrp="1" noChangeAspect="1" noChangeArrowheads="1"/>
+          </p:cNvPicPr>
+          <p:nvPr>
+            <p:ph sz="half" idx="2"/>
+          </p:nvPr>
+        </p:nvPicPr>
+        <p:blipFill>
+          <a:blip r:embed="rId2">
+            <a:extLst>
+              <a:ext uri="{28A0092B-C50C-407E-A947-70E740481C1C}">
+                <a14:useLocalDpi xmlns:a14="http://schemas.microsoft.com/office/drawing/2010/main" val="0"/>
+              </a:ext>
+            </a:extLst>
+          </a:blip>
+          <a:srcRect/>
+          <a:stretch>
+            <a:fillRect/>
+          </a:stretch>
+        </p:blipFill>
+        <p:spPr bwMode="auto">
+          <a:xfrm>
+            <a:off x="6172200" y="2091663"/>
+            <a:ext cx="5181600" cy="2674674"/>
+          </a:xfrm>
+          <a:prstGeom prst="rect">
+            <a:avLst/>
+          </a:prstGeom>
+          <a:noFill/>
+          <a:extLst>
+            <a:ext uri="{909E8E84-426E-40DD-AFC4-6F175D3DCCD1}">
+              <a14:hiddenFill xmlns:a14="http://schemas.microsoft.com/office/drawing/2010/main">
+                <a:solidFill>
+                  <a:srgbClr val="FFFFFF"/>
+                </a:solidFill>
+              </a14:hiddenFill>
+            </a:ext>
+          </a:extLst>
+        </p:spPr>
+      </p:pic>
+    </p:spTree>
+    <p:extLst>
+      <p:ext uri="{BB962C8B-B14F-4D97-AF65-F5344CB8AC3E}">
+        <p14:creationId xmlns:p14="http://schemas.microsoft.com/office/powerpoint/2010/main" val="3037118411"/>
+      </p:ext>
+    </p:extLst>
+  </p:cSld>
+  <p:clrMapOvr>
+    <a:masterClrMapping/>
+  </p:clrMapOvr>
+</p:sld>
+</file>
+
 <file path=ppt/slides/slide5.xml><?xml version="1.0" encoding="utf-8"?>
 <p:sld xmlns:a="http://schemas.openxmlformats.org/drawingml/2006/main" xmlns:r="http://schemas.openxmlformats.org/officeDocument/2006/relationships" xmlns:p="http://schemas.openxmlformats.org/presentationml/2006/main">
   <p:cSld>
@@ -3987,6 +4830,266 @@
           <p:cNvPr id="2" name="Title 1">
             <a:extLst>
               <a:ext uri="{FF2B5EF4-FFF2-40B4-BE49-F238E27FC236}">
+                <a16:creationId xmlns:a16="http://schemas.microsoft.com/office/drawing/2014/main" id="{8FD710D0-64BF-4D28-B4E0-52BA1972C94C}"/>
+              </a:ext>
+            </a:extLst>
+          </p:cNvPr>
+          <p:cNvSpPr>
+            <a:spLocks noGrp="1"/>
+          </p:cNvSpPr>
+          <p:nvPr>
+            <p:ph type="title"/>
+          </p:nvPr>
+        </p:nvSpPr>
+        <p:spPr/>
+        <p:txBody>
+          <a:bodyPr/>
+          <a:lstStyle/>
+          <a:p>
+            <a:r>
+              <a:rPr lang="en-US" dirty="0"/>
+              <a:t>Sample Raw Conversation to Data Frame Example</a:t>
+            </a:r>
+            <a:endParaRPr lang="en-CA" dirty="0"/>
+          </a:p>
+        </p:txBody>
+      </p:sp>
+      <p:pic>
+        <p:nvPicPr>
+          <p:cNvPr id="9" name="Content Placeholder 8">
+            <a:extLst>
+              <a:ext uri="{FF2B5EF4-FFF2-40B4-BE49-F238E27FC236}">
+                <a16:creationId xmlns:a16="http://schemas.microsoft.com/office/drawing/2014/main" id="{053D1EB7-1330-4523-AA73-D097D48E23D5}"/>
+              </a:ext>
+            </a:extLst>
+          </p:cNvPr>
+          <p:cNvPicPr>
+            <a:picLocks noGrp="1" noChangeAspect="1"/>
+          </p:cNvPicPr>
+          <p:nvPr>
+            <p:ph sz="half" idx="1"/>
+          </p:nvPr>
+        </p:nvPicPr>
+        <p:blipFill>
+          <a:blip r:embed="rId2"/>
+          <a:stretch>
+            <a:fillRect/>
+          </a:stretch>
+        </p:blipFill>
+        <p:spPr>
+          <a:xfrm>
+            <a:off x="838200" y="2063637"/>
+            <a:ext cx="5181600" cy="3875314"/>
+          </a:xfrm>
+          <a:prstGeom prst="rect">
+            <a:avLst/>
+          </a:prstGeom>
+        </p:spPr>
+      </p:pic>
+      <p:pic>
+        <p:nvPicPr>
+          <p:cNvPr id="8" name="Picture 7">
+            <a:extLst>
+              <a:ext uri="{FF2B5EF4-FFF2-40B4-BE49-F238E27FC236}">
+                <a16:creationId xmlns:a16="http://schemas.microsoft.com/office/drawing/2014/main" id="{80D3A22C-3F9F-49B2-8DE4-A8862F046F8F}"/>
+              </a:ext>
+            </a:extLst>
+          </p:cNvPr>
+          <p:cNvPicPr>
+            <a:picLocks noChangeAspect="1"/>
+          </p:cNvPicPr>
+          <p:nvPr/>
+        </p:nvPicPr>
+        <p:blipFill>
+          <a:blip r:embed="rId3"/>
+          <a:stretch>
+            <a:fillRect/>
+          </a:stretch>
+        </p:blipFill>
+        <p:spPr>
+          <a:xfrm>
+            <a:off x="6172202" y="2063862"/>
+            <a:ext cx="5744377" cy="2943636"/>
+          </a:xfrm>
+          <a:prstGeom prst="rect">
+            <a:avLst/>
+          </a:prstGeom>
+        </p:spPr>
+      </p:pic>
+      <p:cxnSp>
+        <p:nvCxnSpPr>
+          <p:cNvPr id="11" name="Straight Arrow Connector 10">
+            <a:extLst>
+              <a:ext uri="{FF2B5EF4-FFF2-40B4-BE49-F238E27FC236}">
+                <a16:creationId xmlns:a16="http://schemas.microsoft.com/office/drawing/2014/main" id="{2C8D59F4-1FAD-4321-B40F-398ED9128027}"/>
+              </a:ext>
+            </a:extLst>
+          </p:cNvPr>
+          <p:cNvCxnSpPr/>
+          <p:nvPr/>
+        </p:nvCxnSpPr>
+        <p:spPr>
+          <a:xfrm flipV="1">
+            <a:off x="5838092" y="2649415"/>
+            <a:ext cx="2133600" cy="257908"/>
+          </a:xfrm>
+          <a:prstGeom prst="straightConnector1">
+            <a:avLst/>
+          </a:prstGeom>
+          <a:ln w="92075">
+            <a:tailEnd type="triangle"/>
+          </a:ln>
+        </p:spPr>
+        <p:style>
+          <a:lnRef idx="1">
+            <a:schemeClr val="accent1"/>
+          </a:lnRef>
+          <a:fillRef idx="0">
+            <a:schemeClr val="accent1"/>
+          </a:fillRef>
+          <a:effectRef idx="0">
+            <a:schemeClr val="accent1"/>
+          </a:effectRef>
+          <a:fontRef idx="minor">
+            <a:schemeClr val="tx1"/>
+          </a:fontRef>
+        </p:style>
+      </p:cxnSp>
+      <p:sp>
+        <p:nvSpPr>
+          <p:cNvPr id="12" name="Flowchart: Process 11">
+            <a:extLst>
+              <a:ext uri="{FF2B5EF4-FFF2-40B4-BE49-F238E27FC236}">
+                <a16:creationId xmlns:a16="http://schemas.microsoft.com/office/drawing/2014/main" id="{653FD76D-8353-4247-9658-6A90E8A0F306}"/>
+              </a:ext>
+            </a:extLst>
+          </p:cNvPr>
+          <p:cNvSpPr/>
+          <p:nvPr/>
+        </p:nvSpPr>
+        <p:spPr>
+          <a:xfrm>
+            <a:off x="773722" y="1624614"/>
+            <a:ext cx="5064370" cy="417766"/>
+          </a:xfrm>
+          <a:prstGeom prst="flowChartProcess">
+            <a:avLst/>
+          </a:prstGeom>
+        </p:spPr>
+        <p:style>
+          <a:lnRef idx="2">
+            <a:schemeClr val="accent1">
+              <a:shade val="50000"/>
+            </a:schemeClr>
+          </a:lnRef>
+          <a:fillRef idx="1">
+            <a:schemeClr val="accent1"/>
+          </a:fillRef>
+          <a:effectRef idx="0">
+            <a:schemeClr val="accent1"/>
+          </a:effectRef>
+          <a:fontRef idx="minor">
+            <a:schemeClr val="lt1"/>
+          </a:fontRef>
+        </p:style>
+        <p:txBody>
+          <a:bodyPr rtlCol="0" anchor="ctr"/>
+          <a:lstStyle/>
+          <a:p>
+            <a:pPr algn="ctr"/>
+            <a:r>
+              <a:rPr lang="en-US" dirty="0"/>
+              <a:t>Raw Conversation Data</a:t>
+            </a:r>
+            <a:endParaRPr lang="en-CA" dirty="0"/>
+          </a:p>
+        </p:txBody>
+      </p:sp>
+      <p:sp>
+        <p:nvSpPr>
+          <p:cNvPr id="13" name="Flowchart: Process 12">
+            <a:extLst>
+              <a:ext uri="{FF2B5EF4-FFF2-40B4-BE49-F238E27FC236}">
+                <a16:creationId xmlns:a16="http://schemas.microsoft.com/office/drawing/2014/main" id="{EBAB2615-062B-4268-B8DD-D7B85A821A6A}"/>
+              </a:ext>
+            </a:extLst>
+          </p:cNvPr>
+          <p:cNvSpPr/>
+          <p:nvPr/>
+        </p:nvSpPr>
+        <p:spPr>
+          <a:xfrm>
+            <a:off x="6172202" y="1624614"/>
+            <a:ext cx="5744376" cy="417766"/>
+          </a:xfrm>
+          <a:prstGeom prst="flowChartProcess">
+            <a:avLst/>
+          </a:prstGeom>
+        </p:spPr>
+        <p:style>
+          <a:lnRef idx="2">
+            <a:schemeClr val="accent1">
+              <a:shade val="50000"/>
+            </a:schemeClr>
+          </a:lnRef>
+          <a:fillRef idx="1">
+            <a:schemeClr val="accent1"/>
+          </a:fillRef>
+          <a:effectRef idx="0">
+            <a:schemeClr val="accent1"/>
+          </a:effectRef>
+          <a:fontRef idx="minor">
+            <a:schemeClr val="lt1"/>
+          </a:fontRef>
+        </p:style>
+        <p:txBody>
+          <a:bodyPr rtlCol="0" anchor="ctr"/>
+          <a:lstStyle/>
+          <a:p>
+            <a:pPr algn="ctr"/>
+            <a:r>
+              <a:rPr lang="en-US" dirty="0"/>
+              <a:t>Data Frame</a:t>
+            </a:r>
+            <a:endParaRPr lang="en-CA" dirty="0"/>
+          </a:p>
+        </p:txBody>
+      </p:sp>
+    </p:spTree>
+    <p:extLst>
+      <p:ext uri="{BB962C8B-B14F-4D97-AF65-F5344CB8AC3E}">
+        <p14:creationId xmlns:p14="http://schemas.microsoft.com/office/powerpoint/2010/main" val="1817769397"/>
+      </p:ext>
+    </p:extLst>
+  </p:cSld>
+  <p:clrMapOvr>
+    <a:masterClrMapping/>
+  </p:clrMapOvr>
+</p:sld>
+</file>
+
+<file path=ppt/slides/slide6.xml><?xml version="1.0" encoding="utf-8"?>
+<p:sld xmlns:a="http://schemas.openxmlformats.org/drawingml/2006/main" xmlns:r="http://schemas.openxmlformats.org/officeDocument/2006/relationships" xmlns:p="http://schemas.openxmlformats.org/presentationml/2006/main">
+  <p:cSld>
+    <p:spTree>
+      <p:nvGrpSpPr>
+        <p:cNvPr id="1" name=""/>
+        <p:cNvGrpSpPr/>
+        <p:nvPr/>
+      </p:nvGrpSpPr>
+      <p:grpSpPr>
+        <a:xfrm>
+          <a:off x="0" y="0"/>
+          <a:ext cx="0" cy="0"/>
+          <a:chOff x="0" y="0"/>
+          <a:chExt cx="0" cy="0"/>
+        </a:xfrm>
+      </p:grpSpPr>
+      <p:sp>
+        <p:nvSpPr>
+          <p:cNvPr id="2" name="Title 1">
+            <a:extLst>
+              <a:ext uri="{FF2B5EF4-FFF2-40B4-BE49-F238E27FC236}">
                 <a16:creationId xmlns:a16="http://schemas.microsoft.com/office/drawing/2014/main" id="{C4ED92FF-99F0-4E01-8DB8-C81CB6E5269C}"/>
               </a:ext>
             </a:extLst>
@@ -4029,7 +5132,9 @@
         </p:nvSpPr>
         <p:spPr/>
         <p:txBody>
-          <a:bodyPr/>
+          <a:bodyPr>
+            <a:normAutofit/>
+          </a:bodyPr>
           <a:lstStyle/>
           <a:p>
             <a:pPr marL="0" indent="0">
@@ -4043,19 +5148,25 @@
           <a:p>
             <a:r>
               <a:rPr lang="en-US" dirty="0"/>
-              <a:t>The dataset includes JSON files that needed to be imported</a:t>
+              <a:t>Import JSON file</a:t>
             </a:r>
           </a:p>
           <a:p>
             <a:r>
               <a:rPr lang="en-US" dirty="0"/>
-              <a:t>The data itself needs to be extracted into a data frame containing only the columns of interest for our project</a:t>
+              <a:t>Extract text and label columns</a:t>
             </a:r>
           </a:p>
           <a:p>
             <a:r>
               <a:rPr lang="en-US" dirty="0"/>
-              <a:t>Combining all dialog into one cell representing the conversation</a:t>
+              <a:t>Cleaning the Conversation text column for NLP</a:t>
+            </a:r>
+          </a:p>
+          <a:p>
+            <a:r>
+              <a:rPr lang="en-US" dirty="0"/>
+              <a:t>Save cleaned data to a database file for easy retrieval</a:t>
             </a:r>
           </a:p>
           <a:p>
@@ -4201,148 +5312,6 @@
 </p:sld>
 </file>
 
-<file path=ppt/slides/slide6.xml><?xml version="1.0" encoding="utf-8"?>
-<p:sld xmlns:a="http://schemas.openxmlformats.org/drawingml/2006/main" xmlns:r="http://schemas.openxmlformats.org/officeDocument/2006/relationships" xmlns:p="http://schemas.openxmlformats.org/presentationml/2006/main">
-  <p:cSld>
-    <p:spTree>
-      <p:nvGrpSpPr>
-        <p:cNvPr id="1" name=""/>
-        <p:cNvGrpSpPr/>
-        <p:nvPr/>
-      </p:nvGrpSpPr>
-      <p:grpSpPr>
-        <a:xfrm>
-          <a:off x="0" y="0"/>
-          <a:ext cx="0" cy="0"/>
-          <a:chOff x="0" y="0"/>
-          <a:chExt cx="0" cy="0"/>
-        </a:xfrm>
-      </p:grpSpPr>
-      <p:sp>
-        <p:nvSpPr>
-          <p:cNvPr id="4" name="Title 3">
-            <a:extLst>
-              <a:ext uri="{FF2B5EF4-FFF2-40B4-BE49-F238E27FC236}">
-                <a16:creationId xmlns:a16="http://schemas.microsoft.com/office/drawing/2014/main" id="{311E55CB-BA9F-49CC-844D-A22FA095A609}"/>
-              </a:ext>
-            </a:extLst>
-          </p:cNvPr>
-          <p:cNvSpPr>
-            <a:spLocks noGrp="1"/>
-          </p:cNvSpPr>
-          <p:nvPr>
-            <p:ph type="title"/>
-          </p:nvPr>
-        </p:nvSpPr>
-        <p:spPr/>
-        <p:txBody>
-          <a:bodyPr/>
-          <a:lstStyle/>
-          <a:p>
-            <a:r>
-              <a:rPr lang="en-US" dirty="0"/>
-              <a:t>Data Clean Up</a:t>
-            </a:r>
-          </a:p>
-        </p:txBody>
-      </p:sp>
-      <p:sp>
-        <p:nvSpPr>
-          <p:cNvPr id="2" name="Content Placeholder 1">
-            <a:extLst>
-              <a:ext uri="{FF2B5EF4-FFF2-40B4-BE49-F238E27FC236}">
-                <a16:creationId xmlns:a16="http://schemas.microsoft.com/office/drawing/2014/main" id="{0E46D7D8-16D4-45F2-BF76-068267957C29}"/>
-              </a:ext>
-            </a:extLst>
-          </p:cNvPr>
-          <p:cNvSpPr>
-            <a:spLocks noGrp="1"/>
-          </p:cNvSpPr>
-          <p:nvPr>
-            <p:ph sz="half" idx="1"/>
-          </p:nvPr>
-        </p:nvSpPr>
-        <p:spPr/>
-        <p:txBody>
-          <a:bodyPr/>
-          <a:lstStyle/>
-          <a:p>
-            <a:r>
-              <a:rPr lang="en-US" dirty="0"/>
-              <a:t>Categories</a:t>
-            </a:r>
-          </a:p>
-          <a:p>
-            <a:r>
-              <a:rPr lang="en-US" dirty="0"/>
-              <a:t>Cleaning the Dataset for NLP</a:t>
-            </a:r>
-          </a:p>
-          <a:p>
-            <a:pPr lvl="1"/>
-            <a:r>
-              <a:rPr lang="en-US" dirty="0"/>
-              <a:t>Regular Expression to remove bad characters</a:t>
-            </a:r>
-          </a:p>
-          <a:p>
-            <a:pPr lvl="1"/>
-            <a:endParaRPr lang="en-US" dirty="0"/>
-          </a:p>
-          <a:p>
-            <a:r>
-              <a:rPr lang="en-US" dirty="0"/>
-              <a:t>NLP</a:t>
-            </a:r>
-            <a:endParaRPr lang="en-CA" dirty="0"/>
-          </a:p>
-        </p:txBody>
-      </p:sp>
-      <p:pic>
-        <p:nvPicPr>
-          <p:cNvPr id="6" name="Content Placeholder 5">
-            <a:extLst>
-              <a:ext uri="{FF2B5EF4-FFF2-40B4-BE49-F238E27FC236}">
-                <a16:creationId xmlns:a16="http://schemas.microsoft.com/office/drawing/2014/main" id="{7A83B1A7-2459-44E9-A2D6-73329FB01F46}"/>
-              </a:ext>
-            </a:extLst>
-          </p:cNvPr>
-          <p:cNvPicPr>
-            <a:picLocks noGrp="1" noChangeAspect="1"/>
-          </p:cNvPicPr>
-          <p:nvPr>
-            <p:ph sz="half" idx="2"/>
-          </p:nvPr>
-        </p:nvPicPr>
-        <p:blipFill>
-          <a:blip r:embed="rId2"/>
-          <a:stretch>
-            <a:fillRect/>
-          </a:stretch>
-        </p:blipFill>
-        <p:spPr>
-          <a:xfrm>
-            <a:off x="6172202" y="1428262"/>
-            <a:ext cx="3300981" cy="2031879"/>
-          </a:xfrm>
-          <a:prstGeom prst="rect">
-            <a:avLst/>
-          </a:prstGeom>
-        </p:spPr>
-      </p:pic>
-    </p:spTree>
-    <p:extLst>
-      <p:ext uri="{BB962C8B-B14F-4D97-AF65-F5344CB8AC3E}">
-        <p14:creationId xmlns:p14="http://schemas.microsoft.com/office/powerpoint/2010/main" val="732142988"/>
-      </p:ext>
-    </p:extLst>
-  </p:cSld>
-  <p:clrMapOvr>
-    <a:masterClrMapping/>
-  </p:clrMapOvr>
-</p:sld>
-</file>
-
 <file path=ppt/slides/slide7.xml><?xml version="1.0" encoding="utf-8"?>
 <p:sld xmlns:a="http://schemas.openxmlformats.org/drawingml/2006/main" xmlns:r="http://schemas.openxmlformats.org/officeDocument/2006/relationships" xmlns:p="http://schemas.openxmlformats.org/presentationml/2006/main">
   <p:cSld>
@@ -4376,57 +5345,39 @@
             <p:ph type="title"/>
           </p:nvPr>
         </p:nvSpPr>
-        <p:spPr/>
+        <p:spPr>
+          <a:xfrm>
+            <a:off x="1002323" y="479181"/>
+            <a:ext cx="10515600" cy="1325563"/>
+          </a:xfrm>
+        </p:spPr>
         <p:txBody>
           <a:bodyPr/>
           <a:lstStyle/>
           <a:p>
             <a:r>
               <a:rPr lang="en-US" dirty="0"/>
-              <a:t>Exploratory Data Analysis</a:t>
+              <a:t>Exploratory Data Analysis – Categories</a:t>
             </a:r>
             <a:endParaRPr lang="en-CA" dirty="0"/>
-          </a:p>
-        </p:txBody>
-      </p:sp>
-      <p:sp>
-        <p:nvSpPr>
-          <p:cNvPr id="2" name="Content Placeholder 1">
-            <a:extLst>
-              <a:ext uri="{FF2B5EF4-FFF2-40B4-BE49-F238E27FC236}">
-                <a16:creationId xmlns:a16="http://schemas.microsoft.com/office/drawing/2014/main" id="{F3816176-0D3A-49D4-9505-7EA0FEB07EDD}"/>
-              </a:ext>
-            </a:extLst>
-          </p:cNvPr>
-          <p:cNvSpPr>
-            <a:spLocks noGrp="1"/>
-          </p:cNvSpPr>
-          <p:nvPr>
-            <p:ph sz="half" idx="1"/>
-          </p:nvPr>
-        </p:nvSpPr>
-        <p:spPr/>
-        <p:txBody>
-          <a:bodyPr/>
-          <a:lstStyle/>
-          <a:p>
-            <a:endParaRPr lang="en-CA"/>
           </a:p>
         </p:txBody>
       </p:sp>
       <p:pic>
         <p:nvPicPr>
-          <p:cNvPr id="7" name="Picture 6">
-            <a:extLst>
-              <a:ext uri="{FF2B5EF4-FFF2-40B4-BE49-F238E27FC236}">
-                <a16:creationId xmlns:a16="http://schemas.microsoft.com/office/drawing/2014/main" id="{88750E09-3E12-42B8-B768-F637CA917541}"/>
+          <p:cNvPr id="17" name="Content Placeholder 16">
+            <a:extLst>
+              <a:ext uri="{FF2B5EF4-FFF2-40B4-BE49-F238E27FC236}">
+                <a16:creationId xmlns:a16="http://schemas.microsoft.com/office/drawing/2014/main" id="{92692C5C-90AF-4911-BDF2-47542401EF98}"/>
               </a:ext>
             </a:extLst>
           </p:cNvPr>
           <p:cNvPicPr>
-            <a:picLocks noChangeAspect="1"/>
+            <a:picLocks noGrp="1" noChangeAspect="1"/>
           </p:cNvPicPr>
-          <p:nvPr/>
+          <p:nvPr>
+            <p:ph sz="half" idx="2"/>
+          </p:nvPr>
         </p:nvPicPr>
         <p:blipFill>
           <a:blip r:embed="rId2"/>
@@ -4436,20 +5387,76 @@
         </p:blipFill>
         <p:spPr>
           <a:xfrm>
-            <a:off x="8497824" y="365125"/>
-            <a:ext cx="3376589" cy="2337608"/>
+            <a:off x="6172200" y="2081054"/>
+            <a:ext cx="5181600" cy="3840479"/>
           </a:xfrm>
           <a:prstGeom prst="rect">
             <a:avLst/>
           </a:prstGeom>
         </p:spPr>
       </p:pic>
+      <p:sp>
+        <p:nvSpPr>
+          <p:cNvPr id="15" name="Content Placeholder 14">
+            <a:extLst>
+              <a:ext uri="{FF2B5EF4-FFF2-40B4-BE49-F238E27FC236}">
+                <a16:creationId xmlns:a16="http://schemas.microsoft.com/office/drawing/2014/main" id="{4ABAB715-31DB-4F38-96C7-A8FFD86A8AAB}"/>
+              </a:ext>
+            </a:extLst>
+          </p:cNvPr>
+          <p:cNvSpPr>
+            <a:spLocks noGrp="1"/>
+          </p:cNvSpPr>
+          <p:nvPr>
+            <p:ph sz="half" idx="1"/>
+          </p:nvPr>
+        </p:nvSpPr>
+        <p:spPr/>
+        <p:txBody>
+          <a:bodyPr>
+            <a:normAutofit/>
+          </a:bodyPr>
+          <a:lstStyle/>
+          <a:p>
+            <a:endParaRPr lang="en-US" dirty="0"/>
+          </a:p>
+          <a:p>
+            <a:endParaRPr lang="en-US" dirty="0"/>
+          </a:p>
+          <a:p>
+            <a:endParaRPr lang="en-US" dirty="0"/>
+          </a:p>
+          <a:p>
+            <a:endParaRPr lang="en-US" dirty="0"/>
+          </a:p>
+          <a:p>
+            <a:endParaRPr lang="en-US" dirty="0"/>
+          </a:p>
+          <a:p>
+            <a:endParaRPr lang="en-US" dirty="0"/>
+          </a:p>
+          <a:p>
+            <a:r>
+              <a:rPr lang="en-US" dirty="0"/>
+              <a:t>Label class counts</a:t>
+            </a:r>
+          </a:p>
+          <a:p>
+            <a:pPr lvl="1"/>
+            <a:r>
+              <a:rPr lang="en-US" dirty="0"/>
+              <a:t>Shows our dataset is relatively balanced</a:t>
+            </a:r>
+            <a:endParaRPr lang="en-CA" dirty="0"/>
+          </a:p>
+        </p:txBody>
+      </p:sp>
       <p:pic>
         <p:nvPicPr>
-          <p:cNvPr id="8" name="Picture 7">
-            <a:extLst>
-              <a:ext uri="{FF2B5EF4-FFF2-40B4-BE49-F238E27FC236}">
-                <a16:creationId xmlns:a16="http://schemas.microsoft.com/office/drawing/2014/main" id="{98015ABF-07A7-4B28-B424-90C9500B6403}"/>
+          <p:cNvPr id="16" name="Content Placeholder 8">
+            <a:extLst>
+              <a:ext uri="{FF2B5EF4-FFF2-40B4-BE49-F238E27FC236}">
+                <a16:creationId xmlns:a16="http://schemas.microsoft.com/office/drawing/2014/main" id="{0E168A1A-9942-452E-BB1B-A6BEA6ABB515}"/>
               </a:ext>
             </a:extLst>
           </p:cNvPr>
@@ -4466,40 +5473,8 @@
         </p:blipFill>
         <p:spPr>
           <a:xfrm>
-            <a:off x="6172202" y="2304952"/>
-            <a:ext cx="3528332" cy="2100198"/>
-          </a:xfrm>
-          <a:prstGeom prst="rect">
-            <a:avLst/>
-          </a:prstGeom>
-        </p:spPr>
-      </p:pic>
-      <p:pic>
-        <p:nvPicPr>
-          <p:cNvPr id="6" name="Content Placeholder 5">
-            <a:extLst>
-              <a:ext uri="{FF2B5EF4-FFF2-40B4-BE49-F238E27FC236}">
-                <a16:creationId xmlns:a16="http://schemas.microsoft.com/office/drawing/2014/main" id="{C9D3ACF7-3B7F-44A1-A77A-49EAE236BAD5}"/>
-              </a:ext>
-            </a:extLst>
-          </p:cNvPr>
-          <p:cNvPicPr>
-            <a:picLocks noGrp="1" noChangeAspect="1"/>
-          </p:cNvPicPr>
-          <p:nvPr>
-            <p:ph sz="half" idx="2"/>
-          </p:nvPr>
-        </p:nvPicPr>
-        <p:blipFill>
-          <a:blip r:embed="rId4"/>
-          <a:stretch>
-            <a:fillRect/>
-          </a:stretch>
-        </p:blipFill>
-        <p:spPr>
-          <a:xfrm>
-            <a:off x="8222998" y="4247778"/>
-            <a:ext cx="3683047" cy="2450876"/>
+            <a:off x="838199" y="1714975"/>
+            <a:ext cx="4023361" cy="2943923"/>
           </a:xfrm>
           <a:prstGeom prst="rect">
             <a:avLst/>
@@ -4510,6 +5485,274 @@
     <p:extLst>
       <p:ext uri="{BB962C8B-B14F-4D97-AF65-F5344CB8AC3E}">
         <p14:creationId xmlns:p14="http://schemas.microsoft.com/office/powerpoint/2010/main" val="1995460775"/>
+      </p:ext>
+    </p:extLst>
+  </p:cSld>
+  <p:clrMapOvr>
+    <a:masterClrMapping/>
+  </p:clrMapOvr>
+</p:sld>
+</file>
+
+<file path=ppt/slides/slide8.xml><?xml version="1.0" encoding="utf-8"?>
+<p:sld xmlns:a="http://schemas.openxmlformats.org/drawingml/2006/main" xmlns:r="http://schemas.openxmlformats.org/officeDocument/2006/relationships" xmlns:p="http://schemas.openxmlformats.org/presentationml/2006/main">
+  <p:cSld>
+    <p:spTree>
+      <p:nvGrpSpPr>
+        <p:cNvPr id="1" name=""/>
+        <p:cNvGrpSpPr/>
+        <p:nvPr/>
+      </p:nvGrpSpPr>
+      <p:grpSpPr>
+        <a:xfrm>
+          <a:off x="0" y="0"/>
+          <a:ext cx="0" cy="0"/>
+          <a:chOff x="0" y="0"/>
+          <a:chExt cx="0" cy="0"/>
+        </a:xfrm>
+      </p:grpSpPr>
+      <p:sp>
+        <p:nvSpPr>
+          <p:cNvPr id="4" name="Title 3">
+            <a:extLst>
+              <a:ext uri="{FF2B5EF4-FFF2-40B4-BE49-F238E27FC236}">
+                <a16:creationId xmlns:a16="http://schemas.microsoft.com/office/drawing/2014/main" id="{311E55CB-BA9F-49CC-844D-A22FA095A609}"/>
+              </a:ext>
+            </a:extLst>
+          </p:cNvPr>
+          <p:cNvSpPr>
+            <a:spLocks noGrp="1"/>
+          </p:cNvSpPr>
+          <p:nvPr>
+            <p:ph type="title"/>
+          </p:nvPr>
+        </p:nvSpPr>
+        <p:spPr/>
+        <p:txBody>
+          <a:bodyPr/>
+          <a:lstStyle/>
+          <a:p>
+            <a:r>
+              <a:rPr lang="en-US" dirty="0"/>
+              <a:t>Exploratory Data Analysis – Word Exploration</a:t>
+            </a:r>
+            <a:endParaRPr lang="en-CA" dirty="0"/>
+          </a:p>
+        </p:txBody>
+      </p:sp>
+      <p:sp>
+        <p:nvSpPr>
+          <p:cNvPr id="2" name="Content Placeholder 1">
+            <a:extLst>
+              <a:ext uri="{FF2B5EF4-FFF2-40B4-BE49-F238E27FC236}">
+                <a16:creationId xmlns:a16="http://schemas.microsoft.com/office/drawing/2014/main" id="{F3816176-0D3A-49D4-9505-7EA0FEB07EDD}"/>
+              </a:ext>
+            </a:extLst>
+          </p:cNvPr>
+          <p:cNvSpPr>
+            <a:spLocks noGrp="1"/>
+          </p:cNvSpPr>
+          <p:nvPr>
+            <p:ph sz="half" idx="1"/>
+          </p:nvPr>
+        </p:nvSpPr>
+        <p:spPr>
+          <a:xfrm>
+            <a:off x="838199" y="1825625"/>
+            <a:ext cx="4772691" cy="4351338"/>
+          </a:xfrm>
+        </p:spPr>
+        <p:txBody>
+          <a:bodyPr/>
+          <a:lstStyle/>
+          <a:p>
+            <a:r>
+              <a:rPr lang="en-US" dirty="0"/>
+              <a:t>Word review example:</a:t>
+            </a:r>
+          </a:p>
+          <a:p>
+            <a:pPr marL="457200" lvl="1" indent="0">
+              <a:buNone/>
+            </a:pPr>
+            <a:r>
+              <a:rPr lang="en-US" dirty="0"/>
+              <a:t>Instruction_id = ‘movie-finder’</a:t>
+            </a:r>
+            <a:endParaRPr lang="en-CA" dirty="0"/>
+          </a:p>
+        </p:txBody>
+      </p:sp>
+      <p:pic>
+        <p:nvPicPr>
+          <p:cNvPr id="12" name="Content Placeholder 11">
+            <a:extLst>
+              <a:ext uri="{FF2B5EF4-FFF2-40B4-BE49-F238E27FC236}">
+                <a16:creationId xmlns:a16="http://schemas.microsoft.com/office/drawing/2014/main" id="{BDCE4086-AE84-47FD-BE77-E4831AD1A107}"/>
+              </a:ext>
+            </a:extLst>
+          </p:cNvPr>
+          <p:cNvPicPr>
+            <a:picLocks noGrp="1" noChangeAspect="1"/>
+          </p:cNvPicPr>
+          <p:nvPr>
+            <p:ph sz="half" idx="2"/>
+          </p:nvPr>
+        </p:nvPicPr>
+        <p:blipFill>
+          <a:blip r:embed="rId2"/>
+          <a:stretch>
+            <a:fillRect/>
+          </a:stretch>
+        </p:blipFill>
+        <p:spPr>
+          <a:xfrm>
+            <a:off x="6376654" y="2100791"/>
+            <a:ext cx="4772691" cy="3801005"/>
+          </a:xfrm>
+          <a:prstGeom prst="rect">
+            <a:avLst/>
+          </a:prstGeom>
+        </p:spPr>
+      </p:pic>
+    </p:spTree>
+    <p:extLst>
+      <p:ext uri="{BB962C8B-B14F-4D97-AF65-F5344CB8AC3E}">
+        <p14:creationId xmlns:p14="http://schemas.microsoft.com/office/powerpoint/2010/main" val="887577771"/>
+      </p:ext>
+    </p:extLst>
+  </p:cSld>
+  <p:clrMapOvr>
+    <a:masterClrMapping/>
+  </p:clrMapOvr>
+</p:sld>
+</file>
+
+<file path=ppt/slides/slide9.xml><?xml version="1.0" encoding="utf-8"?>
+<p:sld xmlns:a="http://schemas.openxmlformats.org/drawingml/2006/main" xmlns:r="http://schemas.openxmlformats.org/officeDocument/2006/relationships" xmlns:p="http://schemas.openxmlformats.org/presentationml/2006/main">
+  <p:cSld>
+    <p:spTree>
+      <p:nvGrpSpPr>
+        <p:cNvPr id="1" name=""/>
+        <p:cNvGrpSpPr/>
+        <p:nvPr/>
+      </p:nvGrpSpPr>
+      <p:grpSpPr>
+        <a:xfrm>
+          <a:off x="0" y="0"/>
+          <a:ext cx="0" cy="0"/>
+          <a:chOff x="0" y="0"/>
+          <a:chExt cx="0" cy="0"/>
+        </a:xfrm>
+      </p:grpSpPr>
+      <p:sp>
+        <p:nvSpPr>
+          <p:cNvPr id="4" name="Title 3">
+            <a:extLst>
+              <a:ext uri="{FF2B5EF4-FFF2-40B4-BE49-F238E27FC236}">
+                <a16:creationId xmlns:a16="http://schemas.microsoft.com/office/drawing/2014/main" id="{311E55CB-BA9F-49CC-844D-A22FA095A609}"/>
+              </a:ext>
+            </a:extLst>
+          </p:cNvPr>
+          <p:cNvSpPr>
+            <a:spLocks noGrp="1"/>
+          </p:cNvSpPr>
+          <p:nvPr>
+            <p:ph type="title"/>
+          </p:nvPr>
+        </p:nvSpPr>
+        <p:spPr/>
+        <p:txBody>
+          <a:bodyPr/>
+          <a:lstStyle/>
+          <a:p>
+            <a:r>
+              <a:rPr lang="en-US" dirty="0"/>
+              <a:t>Exploratory Data Analysis – Word Clouds</a:t>
+            </a:r>
+            <a:endParaRPr lang="en-CA" dirty="0"/>
+          </a:p>
+        </p:txBody>
+      </p:sp>
+      <p:sp>
+        <p:nvSpPr>
+          <p:cNvPr id="2" name="Content Placeholder 1">
+            <a:extLst>
+              <a:ext uri="{FF2B5EF4-FFF2-40B4-BE49-F238E27FC236}">
+                <a16:creationId xmlns:a16="http://schemas.microsoft.com/office/drawing/2014/main" id="{F3816176-0D3A-49D4-9505-7EA0FEB07EDD}"/>
+              </a:ext>
+            </a:extLst>
+          </p:cNvPr>
+          <p:cNvSpPr>
+            <a:spLocks noGrp="1"/>
+          </p:cNvSpPr>
+          <p:nvPr>
+            <p:ph sz="half" idx="1"/>
+          </p:nvPr>
+        </p:nvSpPr>
+        <p:spPr>
+          <a:xfrm>
+            <a:off x="838199" y="1825625"/>
+            <a:ext cx="4772691" cy="4351338"/>
+          </a:xfrm>
+        </p:spPr>
+        <p:txBody>
+          <a:bodyPr/>
+          <a:lstStyle/>
+          <a:p>
+            <a:r>
+              <a:rPr lang="en-US" dirty="0"/>
+              <a:t>Word cloud visualization example</a:t>
+            </a:r>
+          </a:p>
+          <a:p>
+            <a:pPr marL="457200" lvl="1" indent="0">
+              <a:buNone/>
+            </a:pPr>
+            <a:r>
+              <a:rPr lang="en-US" dirty="0"/>
+              <a:t>Instruction_id = ‘movie-finder’</a:t>
+            </a:r>
+            <a:endParaRPr lang="en-CA" dirty="0"/>
+          </a:p>
+        </p:txBody>
+      </p:sp>
+      <p:pic>
+        <p:nvPicPr>
+          <p:cNvPr id="6" name="Content Placeholder 5">
+            <a:extLst>
+              <a:ext uri="{FF2B5EF4-FFF2-40B4-BE49-F238E27FC236}">
+                <a16:creationId xmlns:a16="http://schemas.microsoft.com/office/drawing/2014/main" id="{026F8FB5-BDBE-4B1A-946B-7E991EF68210}"/>
+              </a:ext>
+            </a:extLst>
+          </p:cNvPr>
+          <p:cNvPicPr>
+            <a:picLocks noGrp="1" noChangeAspect="1"/>
+          </p:cNvPicPr>
+          <p:nvPr>
+            <p:ph sz="half" idx="2"/>
+          </p:nvPr>
+        </p:nvPicPr>
+        <p:blipFill>
+          <a:blip r:embed="rId2"/>
+          <a:stretch>
+            <a:fillRect/>
+          </a:stretch>
+        </p:blipFill>
+        <p:spPr>
+          <a:xfrm>
+            <a:off x="6172200" y="2240428"/>
+            <a:ext cx="5181600" cy="3521731"/>
+          </a:xfrm>
+          <a:prstGeom prst="rect">
+            <a:avLst/>
+          </a:prstGeom>
+        </p:spPr>
+      </p:pic>
+    </p:spTree>
+    <p:extLst>
+      <p:ext uri="{BB962C8B-B14F-4D97-AF65-F5344CB8AC3E}">
+        <p14:creationId xmlns:p14="http://schemas.microsoft.com/office/powerpoint/2010/main" val="1945158725"/>
       </p:ext>
     </p:extLst>
   </p:cSld>

</xml_diff>